<commit_message>
add smarttuing module (optimization)
</commit_message>
<xml_diff>
--- a/optimization/k8s-automation/st-architecture.pptx
+++ b/optimization/k8s-automation/st-architecture.pptx
@@ -4231,47 +4231,6 @@
           </a:fontRef>
         </p:style>
       </p:cxnSp>
-      <p:cxnSp>
-        <p:nvCxnSpPr>
-          <p:cNvPr id="70" name="Straight Connector 69">
-            <a:extLst>
-              <a:ext uri="{FF2B5EF4-FFF2-40B4-BE49-F238E27FC236}">
-                <a16:creationId xmlns:a16="http://schemas.microsoft.com/office/drawing/2014/main" id="{70CDC194-322B-F94A-9CF0-32687C3F01F0}"/>
-              </a:ext>
-            </a:extLst>
-          </p:cNvPr>
-          <p:cNvCxnSpPr>
-            <a:cxnSpLocks/>
-            <a:stCxn id="16" idx="0"/>
-            <a:endCxn id="1024" idx="2"/>
-          </p:cNvCxnSpPr>
-          <p:nvPr/>
-        </p:nvCxnSpPr>
-        <p:spPr>
-          <a:xfrm>
-            <a:off x="11295014" y="5656607"/>
-            <a:ext cx="176349" cy="0"/>
-          </a:xfrm>
-          <a:prstGeom prst="line">
-            <a:avLst/>
-          </a:prstGeom>
-          <a:ln w="28575"/>
-        </p:spPr>
-        <p:style>
-          <a:lnRef idx="1">
-            <a:schemeClr val="accent1"/>
-          </a:lnRef>
-          <a:fillRef idx="0">
-            <a:schemeClr val="accent1"/>
-          </a:fillRef>
-          <a:effectRef idx="0">
-            <a:schemeClr val="accent1"/>
-          </a:effectRef>
-          <a:fontRef idx="minor">
-            <a:schemeClr val="tx1"/>
-          </a:fontRef>
-        </p:style>
-      </p:cxnSp>
       <p:sp>
         <p:nvSpPr>
           <p:cNvPr id="73" name="Hexagon 72">
@@ -4727,7 +4686,7 @@
           <a:p>
             <a:r>
               <a:rPr lang="en-US" sz="900" dirty="0"/>
-              <a:t>Proxy intercepts and forward all requests to the app, counting how many times they occur</a:t>
+              <a:t>Proxy intercepts and forwards all http requests to the app, counting how many times they occur</a:t>
             </a:r>
           </a:p>
         </p:txBody>
@@ -5122,6 +5081,82 @@
           </a:p>
         </p:txBody>
       </p:sp>
+      <p:sp>
+        <p:nvSpPr>
+          <p:cNvPr id="160" name="TextBox 159">
+            <a:extLst>
+              <a:ext uri="{FF2B5EF4-FFF2-40B4-BE49-F238E27FC236}">
+                <a16:creationId xmlns:a16="http://schemas.microsoft.com/office/drawing/2014/main" id="{BD538E90-3CAD-864D-B0D3-965F7DDE7AB2}"/>
+              </a:ext>
+            </a:extLst>
+          </p:cNvPr>
+          <p:cNvSpPr txBox="1"/>
+          <p:nvPr/>
+        </p:nvSpPr>
+        <p:spPr>
+          <a:xfrm>
+            <a:off x="3193098" y="4650738"/>
+            <a:ext cx="895325" cy="230832"/>
+          </a:xfrm>
+          <a:prstGeom prst="rect">
+            <a:avLst/>
+          </a:prstGeom>
+          <a:noFill/>
+        </p:spPr>
+        <p:txBody>
+          <a:bodyPr wrap="square" rtlCol="0">
+            <a:spAutoFit/>
+          </a:bodyPr>
+          <a:lstStyle/>
+          <a:p>
+            <a:r>
+              <a:rPr lang="en-US" sz="900" dirty="0"/>
+              <a:t>Reloader + API</a:t>
+            </a:r>
+          </a:p>
+        </p:txBody>
+      </p:sp>
+      <p:cxnSp>
+        <p:nvCxnSpPr>
+          <p:cNvPr id="83" name="Straight Connector 82">
+            <a:extLst>
+              <a:ext uri="{FF2B5EF4-FFF2-40B4-BE49-F238E27FC236}">
+                <a16:creationId xmlns:a16="http://schemas.microsoft.com/office/drawing/2014/main" id="{7C4B5AAE-99C3-D246-A65F-8B76252CC4E7}"/>
+              </a:ext>
+            </a:extLst>
+          </p:cNvPr>
+          <p:cNvCxnSpPr>
+            <a:cxnSpLocks/>
+            <a:stCxn id="84" idx="1"/>
+            <a:endCxn id="160" idx="0"/>
+          </p:cNvCxnSpPr>
+          <p:nvPr/>
+        </p:nvCxnSpPr>
+        <p:spPr>
+          <a:xfrm>
+            <a:off x="3475488" y="4212965"/>
+            <a:ext cx="165273" cy="437773"/>
+          </a:xfrm>
+          <a:prstGeom prst="line">
+            <a:avLst/>
+          </a:prstGeom>
+          <a:ln w="19050"/>
+        </p:spPr>
+        <p:style>
+          <a:lnRef idx="1">
+            <a:schemeClr val="accent1"/>
+          </a:lnRef>
+          <a:fillRef idx="0">
+            <a:schemeClr val="accent1"/>
+          </a:fillRef>
+          <a:effectRef idx="0">
+            <a:schemeClr val="accent1"/>
+          </a:effectRef>
+          <a:fontRef idx="minor">
+            <a:schemeClr val="tx1"/>
+          </a:fontRef>
+        </p:style>
+      </p:cxnSp>
     </p:spTree>
     <p:extLst>
       <p:ext uri="{BB962C8B-B14F-4D97-AF65-F5344CB8AC3E}">
@@ -5211,7 +5246,7 @@
           <a:p>
             <a:r>
               <a:rPr lang="en-US" dirty="0"/>
-              <a:t>Independent of application: SmartTuning automatically identifies App’s interface and the histograms through proxies</a:t>
+              <a:t>Independent of application: SmartTuning automatically identifies App’s interface and their histograms through proxies</a:t>
             </a:r>
           </a:p>
           <a:p>

</xml_diff>

<commit_message>
update archtecture to use only reloader rather relaoder+sync
</commit_message>
<xml_diff>
--- a/optimization/k8s-automation/st-architecture.pptx
+++ b/optimization/k8s-automation/st-architecture.pptx
@@ -6,7 +6,6 @@
   </p:sldMasterIdLst>
   <p:sldIdLst>
     <p:sldId id="256" r:id="rId2"/>
-    <p:sldId id="257" r:id="rId3"/>
   </p:sldIdLst>
   <p:sldSz cx="12192000" cy="6858000"/>
   <p:notesSz cx="6858000" cy="9144000"/>
@@ -105,6 +104,11 @@
       </a:defRPr>
     </a:lvl9pPr>
   </p:defaultTextStyle>
+  <p:extLst>
+    <p:ext uri="{EFAFB233-063F-42B5-8137-9DF3F51BA10A}">
+      <p15:sldGuideLst xmlns:p15="http://schemas.microsoft.com/office/powerpoint/2012/main"/>
+    </p:ext>
+  </p:extLst>
 </p:presentation>
 </file>
 
@@ -239,7 +243,7 @@
           <a:p>
             <a:fld id="{B1197E15-315D-6C4E-84BE-9536A06A5A5E}" type="datetimeFigureOut">
               <a:rPr lang="en-US" smtClean="0"/>
-              <a:t>4/21/20</a:t>
+              <a:t>4/27/20</a:t>
             </a:fld>
             <a:endParaRPr lang="en-US"/>
           </a:p>
@@ -409,7 +413,7 @@
           <a:p>
             <a:fld id="{B1197E15-315D-6C4E-84BE-9536A06A5A5E}" type="datetimeFigureOut">
               <a:rPr lang="en-US" smtClean="0"/>
-              <a:t>4/21/20</a:t>
+              <a:t>4/27/20</a:t>
             </a:fld>
             <a:endParaRPr lang="en-US"/>
           </a:p>
@@ -589,7 +593,7 @@
           <a:p>
             <a:fld id="{B1197E15-315D-6C4E-84BE-9536A06A5A5E}" type="datetimeFigureOut">
               <a:rPr lang="en-US" smtClean="0"/>
-              <a:t>4/21/20</a:t>
+              <a:t>4/27/20</a:t>
             </a:fld>
             <a:endParaRPr lang="en-US"/>
           </a:p>
@@ -759,7 +763,7 @@
           <a:p>
             <a:fld id="{B1197E15-315D-6C4E-84BE-9536A06A5A5E}" type="datetimeFigureOut">
               <a:rPr lang="en-US" smtClean="0"/>
-              <a:t>4/21/20</a:t>
+              <a:t>4/27/20</a:t>
             </a:fld>
             <a:endParaRPr lang="en-US"/>
           </a:p>
@@ -1005,7 +1009,7 @@
           <a:p>
             <a:fld id="{B1197E15-315D-6C4E-84BE-9536A06A5A5E}" type="datetimeFigureOut">
               <a:rPr lang="en-US" smtClean="0"/>
-              <a:t>4/21/20</a:t>
+              <a:t>4/27/20</a:t>
             </a:fld>
             <a:endParaRPr lang="en-US"/>
           </a:p>
@@ -1237,7 +1241,7 @@
           <a:p>
             <a:fld id="{B1197E15-315D-6C4E-84BE-9536A06A5A5E}" type="datetimeFigureOut">
               <a:rPr lang="en-US" smtClean="0"/>
-              <a:t>4/21/20</a:t>
+              <a:t>4/27/20</a:t>
             </a:fld>
             <a:endParaRPr lang="en-US"/>
           </a:p>
@@ -1604,7 +1608,7 @@
           <a:p>
             <a:fld id="{B1197E15-315D-6C4E-84BE-9536A06A5A5E}" type="datetimeFigureOut">
               <a:rPr lang="en-US" smtClean="0"/>
-              <a:t>4/21/20</a:t>
+              <a:t>4/27/20</a:t>
             </a:fld>
             <a:endParaRPr lang="en-US"/>
           </a:p>
@@ -1722,7 +1726,7 @@
           <a:p>
             <a:fld id="{B1197E15-315D-6C4E-84BE-9536A06A5A5E}" type="datetimeFigureOut">
               <a:rPr lang="en-US" smtClean="0"/>
-              <a:t>4/21/20</a:t>
+              <a:t>4/27/20</a:t>
             </a:fld>
             <a:endParaRPr lang="en-US"/>
           </a:p>
@@ -1817,7 +1821,7 @@
           <a:p>
             <a:fld id="{B1197E15-315D-6C4E-84BE-9536A06A5A5E}" type="datetimeFigureOut">
               <a:rPr lang="en-US" smtClean="0"/>
-              <a:t>4/21/20</a:t>
+              <a:t>4/27/20</a:t>
             </a:fld>
             <a:endParaRPr lang="en-US"/>
           </a:p>
@@ -2094,7 +2098,7 @@
           <a:p>
             <a:fld id="{B1197E15-315D-6C4E-84BE-9536A06A5A5E}" type="datetimeFigureOut">
               <a:rPr lang="en-US" smtClean="0"/>
-              <a:t>4/21/20</a:t>
+              <a:t>4/27/20</a:t>
             </a:fld>
             <a:endParaRPr lang="en-US"/>
           </a:p>
@@ -2351,7 +2355,7 @@
           <a:p>
             <a:fld id="{B1197E15-315D-6C4E-84BE-9536A06A5A5E}" type="datetimeFigureOut">
               <a:rPr lang="en-US" smtClean="0"/>
-              <a:t>4/21/20</a:t>
+              <a:t>4/27/20</a:t>
             </a:fld>
             <a:endParaRPr lang="en-US"/>
           </a:p>
@@ -2564,7 +2568,7 @@
           <a:p>
             <a:fld id="{B1197E15-315D-6C4E-84BE-9536A06A5A5E}" type="datetimeFigureOut">
               <a:rPr lang="en-US" smtClean="0"/>
-              <a:t>4/21/20</a:t>
+              <a:t>4/27/20</a:t>
             </a:fld>
             <a:endParaRPr lang="en-US"/>
           </a:p>
@@ -2971,56 +2975,6 @@
       </p:grpSpPr>
       <p:sp>
         <p:nvSpPr>
-          <p:cNvPr id="29" name="Rectangle 28">
-            <a:extLst>
-              <a:ext uri="{FF2B5EF4-FFF2-40B4-BE49-F238E27FC236}">
-                <a16:creationId xmlns:a16="http://schemas.microsoft.com/office/drawing/2014/main" id="{C9709091-FE1D-7242-A054-0406AA699247}"/>
-              </a:ext>
-            </a:extLst>
-          </p:cNvPr>
-          <p:cNvSpPr/>
-          <p:nvPr/>
-        </p:nvSpPr>
-        <p:spPr>
-          <a:xfrm>
-            <a:off x="648788" y="644434"/>
-            <a:ext cx="7894321" cy="5738949"/>
-          </a:xfrm>
-          <a:prstGeom prst="rect">
-            <a:avLst/>
-          </a:prstGeom>
-          <a:ln w="9525">
-            <a:solidFill>
-              <a:schemeClr val="tx1"/>
-            </a:solidFill>
-            <a:prstDash val="dash"/>
-          </a:ln>
-        </p:spPr>
-        <p:style>
-          <a:lnRef idx="1">
-            <a:schemeClr val="accent6"/>
-          </a:lnRef>
-          <a:fillRef idx="2">
-            <a:schemeClr val="accent6"/>
-          </a:fillRef>
-          <a:effectRef idx="1">
-            <a:schemeClr val="accent6"/>
-          </a:effectRef>
-          <a:fontRef idx="minor">
-            <a:schemeClr val="dk1"/>
-          </a:fontRef>
-        </p:style>
-        <p:txBody>
-          <a:bodyPr rtlCol="0" anchor="ctr"/>
-          <a:lstStyle/>
-          <a:p>
-            <a:pPr algn="ctr"/>
-            <a:endParaRPr lang="en-US" dirty="0"/>
-          </a:p>
-        </p:txBody>
-      </p:sp>
-      <p:sp>
-        <p:nvSpPr>
           <p:cNvPr id="4" name="Rounded Rectangle 3">
             <a:extLst>
               <a:ext uri="{FF2B5EF4-FFF2-40B4-BE49-F238E27FC236}">
@@ -3459,6 +3413,13 @@
             <a:pPr algn="ctr"/>
             <a:r>
               <a:rPr lang="en-US" dirty="0"/>
+              <a:t>Smart</a:t>
+            </a:r>
+          </a:p>
+          <a:p>
+            <a:pPr algn="ctr"/>
+            <a:r>
+              <a:rPr lang="en-US" dirty="0"/>
               <a:t>Tuning</a:t>
             </a:r>
           </a:p>
@@ -3923,60 +3884,6 @@
           </a:fontRef>
         </p:style>
       </p:cxnSp>
-      <p:sp>
-        <p:nvSpPr>
-          <p:cNvPr id="50" name="Hexagon 49">
-            <a:extLst>
-              <a:ext uri="{FF2B5EF4-FFF2-40B4-BE49-F238E27FC236}">
-                <a16:creationId xmlns:a16="http://schemas.microsoft.com/office/drawing/2014/main" id="{DC09D7D6-1636-A542-A847-6F16C9D8211A}"/>
-              </a:ext>
-            </a:extLst>
-          </p:cNvPr>
-          <p:cNvSpPr/>
-          <p:nvPr/>
-        </p:nvSpPr>
-        <p:spPr>
-          <a:xfrm>
-            <a:off x="10747821" y="3381494"/>
-            <a:ext cx="1262743" cy="1036320"/>
-          </a:xfrm>
-          <a:prstGeom prst="hexagon">
-            <a:avLst/>
-          </a:prstGeom>
-        </p:spPr>
-        <p:style>
-          <a:lnRef idx="3">
-            <a:schemeClr val="lt1"/>
-          </a:lnRef>
-          <a:fillRef idx="1">
-            <a:schemeClr val="accent2"/>
-          </a:fillRef>
-          <a:effectRef idx="1">
-            <a:schemeClr val="accent2"/>
-          </a:effectRef>
-          <a:fontRef idx="minor">
-            <a:schemeClr val="lt1"/>
-          </a:fontRef>
-        </p:style>
-        <p:txBody>
-          <a:bodyPr rtlCol="0" anchor="ctr"/>
-          <a:lstStyle/>
-          <a:p>
-            <a:pPr algn="ctr"/>
-            <a:r>
-              <a:rPr lang="en-US" sz="1200" dirty="0"/>
-              <a:t>Workload</a:t>
-            </a:r>
-          </a:p>
-          <a:p>
-            <a:pPr algn="ctr"/>
-            <a:r>
-              <a:rPr lang="en-US" sz="1200" dirty="0"/>
-              <a:t>Handler</a:t>
-            </a:r>
-          </a:p>
-        </p:txBody>
-      </p:sp>
       <p:cxnSp>
         <p:nvCxnSpPr>
           <p:cNvPr id="51" name="Straight Connector 50">
@@ -3988,48 +3895,7 @@
           </p:cNvPr>
           <p:cNvCxnSpPr>
             <a:cxnSpLocks/>
-            <a:stCxn id="50" idx="4"/>
-            <a:endCxn id="11" idx="1"/>
-          </p:cNvCxnSpPr>
-          <p:nvPr/>
-        </p:nvCxnSpPr>
-        <p:spPr>
-          <a:xfrm flipH="1" flipV="1">
-            <a:off x="11002553" y="2316475"/>
-            <a:ext cx="4348" cy="1065019"/>
-          </a:xfrm>
-          <a:prstGeom prst="line">
-            <a:avLst/>
-          </a:prstGeom>
-          <a:ln w="28575"/>
-        </p:spPr>
-        <p:style>
-          <a:lnRef idx="1">
-            <a:schemeClr val="accent1"/>
-          </a:lnRef>
-          <a:fillRef idx="0">
-            <a:schemeClr val="accent1"/>
-          </a:fillRef>
-          <a:effectRef idx="0">
-            <a:schemeClr val="accent1"/>
-          </a:effectRef>
-          <a:fontRef idx="minor">
-            <a:schemeClr val="tx1"/>
-          </a:fontRef>
-        </p:style>
-      </p:cxnSp>
-      <p:cxnSp>
-        <p:nvCxnSpPr>
-          <p:cNvPr id="53" name="Straight Connector 52">
-            <a:extLst>
-              <a:ext uri="{FF2B5EF4-FFF2-40B4-BE49-F238E27FC236}">
-                <a16:creationId xmlns:a16="http://schemas.microsoft.com/office/drawing/2014/main" id="{F8CFFCDB-D847-4843-B4EF-D21E5D1053C5}"/>
-              </a:ext>
-            </a:extLst>
-          </p:cNvPr>
-          <p:cNvCxnSpPr>
-            <a:cxnSpLocks/>
-            <a:stCxn id="16" idx="4"/>
+            <a:stCxn id="16" idx="5"/>
             <a:endCxn id="11" idx="2"/>
           </p:cNvCxnSpPr>
           <p:nvPr/>
@@ -4037,7 +3903,7 @@
         <p:spPr>
           <a:xfrm flipH="1" flipV="1">
             <a:off x="10257970" y="2316475"/>
-            <a:ext cx="33381" cy="2821972"/>
+            <a:ext cx="777964" cy="2821972"/>
           </a:xfrm>
           <a:prstGeom prst="line">
             <a:avLst/>
@@ -4103,47 +3969,6 @@
           </a:fontRef>
         </p:style>
       </p:cxnSp>
-      <p:cxnSp>
-        <p:nvCxnSpPr>
-          <p:cNvPr id="62" name="Straight Connector 61">
-            <a:extLst>
-              <a:ext uri="{FF2B5EF4-FFF2-40B4-BE49-F238E27FC236}">
-                <a16:creationId xmlns:a16="http://schemas.microsoft.com/office/drawing/2014/main" id="{21CD27D2-45D1-A445-B9A6-BDF9D2400049}"/>
-              </a:ext>
-            </a:extLst>
-          </p:cNvPr>
-          <p:cNvCxnSpPr>
-            <a:cxnSpLocks/>
-            <a:stCxn id="16" idx="5"/>
-            <a:endCxn id="50" idx="2"/>
-          </p:cNvCxnSpPr>
-          <p:nvPr/>
-        </p:nvCxnSpPr>
-        <p:spPr>
-          <a:xfrm flipH="1" flipV="1">
-            <a:off x="11006901" y="4417814"/>
-            <a:ext cx="29033" cy="720633"/>
-          </a:xfrm>
-          <a:prstGeom prst="line">
-            <a:avLst/>
-          </a:prstGeom>
-          <a:ln w="28575"/>
-        </p:spPr>
-        <p:style>
-          <a:lnRef idx="1">
-            <a:schemeClr val="accent1"/>
-          </a:lnRef>
-          <a:fillRef idx="0">
-            <a:schemeClr val="accent1"/>
-          </a:fillRef>
-          <a:effectRef idx="0">
-            <a:schemeClr val="accent1"/>
-          </a:effectRef>
-          <a:fontRef idx="minor">
-            <a:schemeClr val="tx1"/>
-          </a:fontRef>
-        </p:style>
-      </p:cxnSp>
       <p:sp>
         <p:nvSpPr>
           <p:cNvPr id="1024" name="Can 1023">
@@ -4158,7 +3983,7 @@
         </p:nvSpPr>
         <p:spPr>
           <a:xfrm>
-            <a:off x="11471363" y="5251661"/>
+            <a:off x="11450832" y="5887222"/>
             <a:ext cx="631373" cy="809892"/>
           </a:xfrm>
           <a:prstGeom prst="can">
@@ -4202,14 +4027,14 @@
           <p:cNvCxnSpPr>
             <a:cxnSpLocks/>
             <a:stCxn id="1024" idx="1"/>
-            <a:endCxn id="50" idx="1"/>
+            <a:endCxn id="16" idx="0"/>
           </p:cNvCxnSpPr>
           <p:nvPr/>
         </p:nvCxnSpPr>
         <p:spPr>
           <a:xfrm flipH="1" flipV="1">
-            <a:off x="11751484" y="4417814"/>
-            <a:ext cx="35566" cy="833847"/>
+            <a:off x="11295014" y="5656607"/>
+            <a:ext cx="471505" cy="230615"/>
           </a:xfrm>
           <a:prstGeom prst="line">
             <a:avLst/>
@@ -4375,8 +4200,8 @@
           <a:p>
             <a:pPr algn="ctr"/>
             <a:r>
-              <a:rPr lang="en-US" sz="1400" dirty="0"/>
-              <a:t>Sync</a:t>
+              <a:rPr lang="en-US" sz="1100" dirty="0"/>
+              <a:t>Reloader</a:t>
             </a:r>
           </a:p>
         </p:txBody>
@@ -4392,20 +4217,19 @@
           </p:cNvPr>
           <p:cNvCxnSpPr>
             <a:cxnSpLocks/>
-            <a:stCxn id="84" idx="2"/>
-            <a:endCxn id="50" idx="3"/>
+            <a:stCxn id="80" idx="2"/>
+            <a:endCxn id="16" idx="2"/>
           </p:cNvCxnSpPr>
           <p:nvPr/>
         </p:nvCxnSpPr>
         <p:spPr>
-          <a:xfrm rot="5400000" flipH="1" flipV="1">
-            <a:off x="6649510" y="114655"/>
-            <a:ext cx="313311" cy="7883310"/>
-          </a:xfrm>
-          <a:prstGeom prst="bentConnector4">
+          <a:xfrm rot="16200000" flipH="1">
+            <a:off x="5723742" y="1607158"/>
+            <a:ext cx="217018" cy="8918200"/>
+          </a:xfrm>
+          <a:prstGeom prst="bentConnector3">
             <a:avLst>
-              <a:gd name="adj1" fmla="val -745610"/>
-              <a:gd name="adj2" fmla="val 71241"/>
+              <a:gd name="adj1" fmla="val 205337"/>
             </a:avLst>
           </a:prstGeom>
           <a:ln w="28575">
@@ -4581,7 +4405,7 @@
             </a:r>
             <a:r>
               <a:rPr lang="en-US" sz="900" dirty="0"/>
-              <a:t> with a new config</a:t>
+              <a:t> for each new config sampled</a:t>
             </a:r>
           </a:p>
         </p:txBody>
@@ -4705,8 +4529,8 @@
         </p:nvSpPr>
         <p:spPr>
           <a:xfrm>
-            <a:off x="2930972" y="6371435"/>
-            <a:ext cx="3115163" cy="369332"/>
+            <a:off x="2930973" y="6414353"/>
+            <a:ext cx="4349393" cy="369332"/>
           </a:xfrm>
           <a:prstGeom prst="rect">
             <a:avLst/>
@@ -4721,15 +4545,15 @@
           <a:p>
             <a:r>
               <a:rPr lang="en-US" sz="900" dirty="0"/>
-              <a:t>Trigger container identifies what is/was the next/past workload and updates the </a:t>
+              <a:t>When SmartTuning finds a config better than the current in production pod, its </a:t>
             </a:r>
             <a:r>
               <a:rPr lang="en-US" sz="900" dirty="0" err="1"/>
-              <a:t>Configmap</a:t>
+              <a:t>configmap</a:t>
             </a:r>
             <a:r>
               <a:rPr lang="en-US" sz="900" dirty="0"/>
-              <a:t> reloading the pod</a:t>
+              <a:t> is updated and it automatically reloads</a:t>
             </a:r>
           </a:p>
         </p:txBody>
@@ -4792,8 +4616,8 @@
         </p:nvSpPr>
         <p:spPr>
           <a:xfrm rot="18671254">
-            <a:off x="1695698" y="4753118"/>
-            <a:ext cx="1568232" cy="646331"/>
+            <a:off x="1695698" y="4822368"/>
+            <a:ext cx="1568232" cy="507831"/>
           </a:xfrm>
           <a:prstGeom prst="rect">
             <a:avLst/>
@@ -4808,16 +4632,13 @@
           <a:p>
             <a:r>
               <a:rPr lang="en-US" sz="900" dirty="0"/>
-              <a:t>Sync syncs the </a:t>
+              <a:t>Reloader simply reloads production pod at every change in the </a:t>
             </a:r>
             <a:r>
               <a:rPr lang="en-US" sz="900" dirty="0" err="1"/>
               <a:t>configmap</a:t>
             </a:r>
-            <a:r>
-              <a:rPr lang="en-US" sz="900" dirty="0"/>
-              <a:t> with  the best  config  kept in the database and reload the pod</a:t>
-            </a:r>
+            <a:endParaRPr lang="en-US" sz="900" dirty="0"/>
           </a:p>
         </p:txBody>
       </p:sp>
@@ -4834,14 +4655,19 @@
           <p:nvPr/>
         </p:nvSpPr>
         <p:spPr>
-          <a:xfrm rot="16200000">
-            <a:off x="8762412" y="3512118"/>
-            <a:ext cx="2760617" cy="369332"/>
+          <a:xfrm>
+            <a:off x="8617855" y="4580397"/>
+            <a:ext cx="2069011" cy="369332"/>
           </a:xfrm>
           <a:prstGeom prst="rect">
             <a:avLst/>
           </a:prstGeom>
           <a:noFill/>
+          <a:ln>
+            <a:solidFill>
+              <a:schemeClr val="accent1"/>
+            </a:solidFill>
+          </a:ln>
         </p:spPr>
         <p:txBody>
           <a:bodyPr wrap="square" rtlCol="0">
@@ -4851,7 +4677,7 @@
           <a:p>
             <a:r>
               <a:rPr lang="en-US" sz="900" dirty="0"/>
-              <a:t>picks a new config and checks app’s perf (throughput) after T time-units</a:t>
+              <a:t>samples a new config and checks app’s perf (throughput) after T time-units</a:t>
             </a:r>
           </a:p>
         </p:txBody>
@@ -4869,9 +4695,9 @@
           <p:nvPr/>
         </p:nvSpPr>
         <p:spPr>
-          <a:xfrm rot="5400000">
-            <a:off x="10578851" y="2764220"/>
-            <a:ext cx="1198080" cy="230832"/>
+          <a:xfrm rot="4588890">
+            <a:off x="10246853" y="3291851"/>
+            <a:ext cx="1198080" cy="369332"/>
           </a:xfrm>
           <a:prstGeom prst="rect">
             <a:avLst/>
@@ -4886,7 +4712,7 @@
           <a:p>
             <a:r>
               <a:rPr lang="en-US" sz="900" dirty="0"/>
-              <a:t>Classifies workloads</a:t>
+              <a:t>sample workloads and classify them</a:t>
             </a:r>
           </a:p>
         </p:txBody>
@@ -4905,7 +4731,7 @@
         </p:nvSpPr>
         <p:spPr>
           <a:xfrm>
-            <a:off x="8734698" y="6327782"/>
+            <a:off x="8752754" y="6473384"/>
             <a:ext cx="2358740" cy="369332"/>
           </a:xfrm>
           <a:prstGeom prst="rect">
@@ -5081,66 +4907,30 @@
           </a:p>
         </p:txBody>
       </p:sp>
-      <p:sp>
-        <p:nvSpPr>
-          <p:cNvPr id="160" name="TextBox 159">
+      <p:cxnSp>
+        <p:nvCxnSpPr>
+          <p:cNvPr id="20" name="Straight Connector 19">
             <a:extLst>
               <a:ext uri="{FF2B5EF4-FFF2-40B4-BE49-F238E27FC236}">
-                <a16:creationId xmlns:a16="http://schemas.microsoft.com/office/drawing/2014/main" id="{BD538E90-3CAD-864D-B0D3-965F7DDE7AB2}"/>
-              </a:ext>
-            </a:extLst>
-          </p:cNvPr>
-          <p:cNvSpPr txBox="1"/>
-          <p:nvPr/>
-        </p:nvSpPr>
-        <p:spPr>
-          <a:xfrm>
-            <a:off x="3193098" y="4650738"/>
-            <a:ext cx="895325" cy="230832"/>
-          </a:xfrm>
-          <a:prstGeom prst="rect">
-            <a:avLst/>
-          </a:prstGeom>
-          <a:noFill/>
-        </p:spPr>
-        <p:txBody>
-          <a:bodyPr wrap="square" rtlCol="0">
-            <a:spAutoFit/>
-          </a:bodyPr>
-          <a:lstStyle/>
-          <a:p>
-            <a:r>
-              <a:rPr lang="en-US" sz="900" dirty="0"/>
-              <a:t>Reloader + API</a:t>
-            </a:r>
-          </a:p>
-        </p:txBody>
-      </p:sp>
-      <p:cxnSp>
-        <p:nvCxnSpPr>
-          <p:cNvPr id="83" name="Straight Connector 82">
-            <a:extLst>
-              <a:ext uri="{FF2B5EF4-FFF2-40B4-BE49-F238E27FC236}">
-                <a16:creationId xmlns:a16="http://schemas.microsoft.com/office/drawing/2014/main" id="{7C4B5AAE-99C3-D246-A65F-8B76252CC4E7}"/>
+                <a16:creationId xmlns:a16="http://schemas.microsoft.com/office/drawing/2014/main" id="{0D3137ED-4144-A844-9EF5-293F51C9642F}"/>
               </a:ext>
             </a:extLst>
           </p:cNvPr>
           <p:cNvCxnSpPr>
-            <a:cxnSpLocks/>
-            <a:stCxn id="84" idx="1"/>
-            <a:endCxn id="160" idx="0"/>
+            <a:stCxn id="144" idx="2"/>
+            <a:endCxn id="16" idx="4"/>
           </p:cNvCxnSpPr>
           <p:nvPr/>
         </p:nvCxnSpPr>
         <p:spPr>
           <a:xfrm>
-            <a:off x="3475488" y="4212965"/>
-            <a:ext cx="165273" cy="437773"/>
+            <a:off x="9652361" y="4949729"/>
+            <a:ext cx="638990" cy="188718"/>
           </a:xfrm>
           <a:prstGeom prst="line">
             <a:avLst/>
           </a:prstGeom>
-          <a:ln w="19050"/>
+          <a:ln w="28575"/>
         </p:spPr>
         <p:style>
           <a:lnRef idx="1">
@@ -5161,154 +4951,6 @@
     <p:extLst>
       <p:ext uri="{BB962C8B-B14F-4D97-AF65-F5344CB8AC3E}">
         <p14:creationId xmlns:p14="http://schemas.microsoft.com/office/powerpoint/2010/main" val="1155911684"/>
-      </p:ext>
-    </p:extLst>
-  </p:cSld>
-  <p:clrMapOvr>
-    <a:masterClrMapping/>
-  </p:clrMapOvr>
-</p:sld>
-</file>
-
-<file path=ppt/slides/slide2.xml><?xml version="1.0" encoding="utf-8"?>
-<p:sld xmlns:a="http://schemas.openxmlformats.org/drawingml/2006/main" xmlns:r="http://schemas.openxmlformats.org/officeDocument/2006/relationships" xmlns:p="http://schemas.openxmlformats.org/presentationml/2006/main">
-  <p:cSld>
-    <p:spTree>
-      <p:nvGrpSpPr>
-        <p:cNvPr id="1" name=""/>
-        <p:cNvGrpSpPr/>
-        <p:nvPr/>
-      </p:nvGrpSpPr>
-      <p:grpSpPr>
-        <a:xfrm>
-          <a:off x="0" y="0"/>
-          <a:ext cx="0" cy="0"/>
-          <a:chOff x="0" y="0"/>
-          <a:chExt cx="0" cy="0"/>
-        </a:xfrm>
-      </p:grpSpPr>
-      <p:sp>
-        <p:nvSpPr>
-          <p:cNvPr id="3" name="Title 2">
-            <a:extLst>
-              <a:ext uri="{FF2B5EF4-FFF2-40B4-BE49-F238E27FC236}">
-                <a16:creationId xmlns:a16="http://schemas.microsoft.com/office/drawing/2014/main" id="{1E12167A-740D-E04A-A127-E663F95C43B9}"/>
-              </a:ext>
-            </a:extLst>
-          </p:cNvPr>
-          <p:cNvSpPr>
-            <a:spLocks noGrp="1"/>
-          </p:cNvSpPr>
-          <p:nvPr>
-            <p:ph type="title"/>
-          </p:nvPr>
-        </p:nvSpPr>
-        <p:spPr/>
-        <p:txBody>
-          <a:bodyPr/>
-          <a:lstStyle/>
-          <a:p>
-            <a:r>
-              <a:rPr lang="en-US" dirty="0"/>
-              <a:t>Current version</a:t>
-            </a:r>
-          </a:p>
-        </p:txBody>
-      </p:sp>
-      <p:sp>
-        <p:nvSpPr>
-          <p:cNvPr id="4" name="Content Placeholder 3">
-            <a:extLst>
-              <a:ext uri="{FF2B5EF4-FFF2-40B4-BE49-F238E27FC236}">
-                <a16:creationId xmlns:a16="http://schemas.microsoft.com/office/drawing/2014/main" id="{C4C994A1-A06E-B14C-A723-4B8E62CAE62A}"/>
-              </a:ext>
-            </a:extLst>
-          </p:cNvPr>
-          <p:cNvSpPr>
-            <a:spLocks noGrp="1"/>
-          </p:cNvSpPr>
-          <p:nvPr>
-            <p:ph idx="1"/>
-          </p:nvPr>
-        </p:nvSpPr>
-        <p:spPr/>
-        <p:txBody>
-          <a:bodyPr>
-            <a:normAutofit lnSpcReduction="10000"/>
-          </a:bodyPr>
-          <a:lstStyle/>
-          <a:p>
-            <a:r>
-              <a:rPr lang="en-US" dirty="0"/>
-              <a:t>Kubernetes coordinates the adaptations instead ad-hoc bash scripts</a:t>
-            </a:r>
-          </a:p>
-          <a:p>
-            <a:r>
-              <a:rPr lang="en-US" dirty="0"/>
-              <a:t>Independent of application: SmartTuning automatically identifies App’s interface and their histograms through proxies</a:t>
-            </a:r>
-          </a:p>
-          <a:p>
-            <a:pPr lvl="1"/>
-            <a:r>
-              <a:rPr lang="en-US" dirty="0"/>
-              <a:t>The application doesn’t need to be instrumented for simple scenarios, e.g., tuning based on throughput</a:t>
-            </a:r>
-          </a:p>
-          <a:p>
-            <a:r>
-              <a:rPr lang="en-US" dirty="0"/>
-              <a:t>Tuning is stateless</a:t>
-            </a:r>
-          </a:p>
-          <a:p>
-            <a:pPr lvl="1"/>
-            <a:r>
-              <a:rPr lang="en-US" dirty="0"/>
-              <a:t>in this current implementation SmartTuning cannot keep tracking the configs for each workload, thus it using only Random Search; Bayesian Optimization in next version</a:t>
-            </a:r>
-          </a:p>
-          <a:p>
-            <a:r>
-              <a:rPr lang="en-US" dirty="0"/>
-              <a:t>Workload handler and Sync are partially implemented</a:t>
-            </a:r>
-          </a:p>
-          <a:p>
-            <a:r>
-              <a:rPr lang="en-US" dirty="0"/>
-              <a:t>Two apps for testing: </a:t>
-            </a:r>
-            <a:r>
-              <a:rPr lang="en-US" dirty="0" err="1"/>
-              <a:t>AcmeAir</a:t>
-            </a:r>
-            <a:r>
-              <a:rPr lang="en-US" dirty="0"/>
-              <a:t> and </a:t>
-            </a:r>
-            <a:r>
-              <a:rPr lang="en-US" dirty="0" err="1"/>
-              <a:t>DayTrader</a:t>
-            </a:r>
-            <a:endParaRPr lang="en-US" dirty="0"/>
-          </a:p>
-          <a:p>
-            <a:pPr marL="0" indent="0">
-              <a:buNone/>
-            </a:pPr>
-            <a:endParaRPr lang="en-US" dirty="0"/>
-          </a:p>
-          <a:p>
-            <a:endParaRPr lang="en-US" dirty="0"/>
-          </a:p>
-        </p:txBody>
-      </p:sp>
-    </p:spTree>
-    <p:extLst>
-      <p:ext uri="{BB962C8B-B14F-4D97-AF65-F5344CB8AC3E}">
-        <p14:creationId xmlns:p14="http://schemas.microsoft.com/office/powerpoint/2010/main" val="2270538774"/>
       </p:ext>
     </p:extLst>
   </p:cSld>

</xml_diff>

<commit_message>
add tpe.suggest parameters to config file
</commit_message>
<xml_diff>
--- a/optimization/k8s-automation/st-architecture.pptx
+++ b/optimization/k8s-automation/st-architecture.pptx
@@ -5561,52 +5561,6 @@
           </a:fontRef>
         </p:style>
       </p:cxnSp>
-      <p:cxnSp>
-        <p:nvCxnSpPr>
-          <p:cNvPr id="1051" name="Elbow Connector 1050">
-            <a:extLst>
-              <a:ext uri="{FF2B5EF4-FFF2-40B4-BE49-F238E27FC236}">
-                <a16:creationId xmlns:a16="http://schemas.microsoft.com/office/drawing/2014/main" id="{47FDEBCF-85C8-AE4E-BB6E-536427534EFD}"/>
-              </a:ext>
-            </a:extLst>
-          </p:cNvPr>
-          <p:cNvCxnSpPr>
-            <a:cxnSpLocks/>
-            <a:endCxn id="16" idx="2"/>
-          </p:cNvCxnSpPr>
-          <p:nvPr/>
-        </p:nvCxnSpPr>
-        <p:spPr>
-          <a:xfrm rot="16200000" flipH="1">
-            <a:off x="5723742" y="1607158"/>
-            <a:ext cx="217018" cy="8918200"/>
-          </a:xfrm>
-          <a:prstGeom prst="bentConnector3">
-            <a:avLst>
-              <a:gd name="adj1" fmla="val 205337"/>
-            </a:avLst>
-          </a:prstGeom>
-          <a:ln w="28575">
-            <a:solidFill>
-              <a:srgbClr val="00B050"/>
-            </a:solidFill>
-          </a:ln>
-        </p:spPr>
-        <p:style>
-          <a:lnRef idx="1">
-            <a:schemeClr val="accent1"/>
-          </a:lnRef>
-          <a:fillRef idx="0">
-            <a:schemeClr val="accent1"/>
-          </a:fillRef>
-          <a:effectRef idx="0">
-            <a:schemeClr val="accent1"/>
-          </a:effectRef>
-          <a:fontRef idx="minor">
-            <a:schemeClr val="tx1"/>
-          </a:fontRef>
-        </p:style>
-      </p:cxnSp>
       <p:sp>
         <p:nvSpPr>
           <p:cNvPr id="1056" name="TextBox 1055">
@@ -5794,49 +5748,6 @@
             <a:r>
               <a:rPr lang="en-US" sz="900" dirty="0"/>
               <a:t>Proxy intercepts and forwards all http requests to the app, counting how many times they occur</a:t>
-            </a:r>
-          </a:p>
-        </p:txBody>
-      </p:sp>
-      <p:sp>
-        <p:nvSpPr>
-          <p:cNvPr id="139" name="TextBox 138">
-            <a:extLst>
-              <a:ext uri="{FF2B5EF4-FFF2-40B4-BE49-F238E27FC236}">
-                <a16:creationId xmlns:a16="http://schemas.microsoft.com/office/drawing/2014/main" id="{3776E782-FB47-9940-B7FF-8FFFEAB67BB3}"/>
-              </a:ext>
-            </a:extLst>
-          </p:cNvPr>
-          <p:cNvSpPr txBox="1"/>
-          <p:nvPr/>
-        </p:nvSpPr>
-        <p:spPr>
-          <a:xfrm>
-            <a:off x="2930973" y="6414353"/>
-            <a:ext cx="4349393" cy="369332"/>
-          </a:xfrm>
-          <a:prstGeom prst="rect">
-            <a:avLst/>
-          </a:prstGeom>
-          <a:noFill/>
-        </p:spPr>
-        <p:txBody>
-          <a:bodyPr wrap="square" rtlCol="0">
-            <a:spAutoFit/>
-          </a:bodyPr>
-          <a:lstStyle/>
-          <a:p>
-            <a:r>
-              <a:rPr lang="en-US" sz="900" dirty="0"/>
-              <a:t>When SmartTuning finds a config better than the current in production pod, its </a:t>
-            </a:r>
-            <a:r>
-              <a:rPr lang="en-US" sz="900" dirty="0" err="1"/>
-              <a:t>configmap</a:t>
-            </a:r>
-            <a:r>
-              <a:rPr lang="en-US" sz="900" dirty="0"/>
-              <a:t> is updated and it automatically reloads</a:t>
             </a:r>
           </a:p>
         </p:txBody>
@@ -7428,6 +7339,10 @@
             </a:pathLst>
           </a:custGeom>
           <a:noFill/>
+          <a:ln>
+            <a:headEnd type="none" w="med" len="med"/>
+            <a:tailEnd type="triangle" w="med" len="med"/>
+          </a:ln>
         </p:spPr>
         <p:style>
           <a:lnRef idx="2">

</xml_diff>